<commit_message>
added references on materials
</commit_message>
<xml_diff>
--- a/materials/service_image.pptx
+++ b/materials/service_image.pptx
@@ -5,16 +5,17 @@
     <p:sldMasterId id="2147483696" r:id="rId1"/>
   </p:sldMasterIdLst>
   <p:notesMasterIdLst>
-    <p:notesMasterId r:id="rId6"/>
+    <p:notesMasterId r:id="rId7"/>
   </p:notesMasterIdLst>
   <p:handoutMasterIdLst>
-    <p:handoutMasterId r:id="rId7"/>
+    <p:handoutMasterId r:id="rId8"/>
   </p:handoutMasterIdLst>
   <p:sldIdLst>
     <p:sldId id="256" r:id="rId2"/>
     <p:sldId id="257" r:id="rId3"/>
     <p:sldId id="258" r:id="rId4"/>
     <p:sldId id="259" r:id="rId5"/>
+    <p:sldId id="260" r:id="rId6"/>
   </p:sldIdLst>
   <p:sldSz cx="9144000" cy="6858000" type="screen4x3"/>
   <p:notesSz cx="9926638" cy="6797675"/>
@@ -122,12 +123,13 @@
             <p14:sldId id="257"/>
             <p14:sldId id="258"/>
             <p14:sldId id="259"/>
+            <p14:sldId id="260"/>
           </p14:sldIdLst>
         </p14:section>
       </p14:sectionLst>
     </p:ext>
     <p:ext uri="{EFAFB233-063F-42B5-8137-9DF3F51BA10A}">
-      <p15:sldGuideLst xmlns:p15="http://schemas.microsoft.com/office/powerpoint/2012/main" xmlns="">
+      <p15:sldGuideLst xmlns="" xmlns:p15="http://schemas.microsoft.com/office/powerpoint/2012/main">
         <p15:guide id="1" orient="horz" pos="2160">
           <p15:clr>
             <a:srgbClr val="A4A3A4"/>
@@ -141,7 +143,7 @@
       </p15:sldGuideLst>
     </p:ext>
     <p:ext uri="{2D200454-40CA-4A62-9FC3-DE9A4176ACB9}">
-      <p15:notesGuideLst xmlns:p15="http://schemas.microsoft.com/office/powerpoint/2012/main" xmlns="">
+      <p15:notesGuideLst xmlns="" xmlns:p15="http://schemas.microsoft.com/office/powerpoint/2012/main">
         <p15:guide id="1" orient="horz" pos="2141">
           <p15:clr>
             <a:srgbClr val="A4A3A4"/>
@@ -5104,6 +5106,244 @@
     <p:extLst>
       <p:ext uri="{BB962C8B-B14F-4D97-AF65-F5344CB8AC3E}">
         <p14:creationId xmlns:p14="http://schemas.microsoft.com/office/powerpoint/2010/main" val="1581913065"/>
+      </p:ext>
+    </p:extLst>
+  </p:cSld>
+  <p:clrMapOvr>
+    <a:masterClrMapping/>
+  </p:clrMapOvr>
+</p:sld>
+</file>
+
+<file path=ppt/slides/slide5.xml><?xml version="1.0" encoding="utf-8"?>
+<p:sld xmlns:a="http://schemas.openxmlformats.org/drawingml/2006/main" xmlns:r="http://schemas.openxmlformats.org/officeDocument/2006/relationships" xmlns:p="http://schemas.openxmlformats.org/presentationml/2006/main">
+  <p:cSld>
+    <p:spTree>
+      <p:nvGrpSpPr>
+        <p:cNvPr id="1" name=""/>
+        <p:cNvGrpSpPr/>
+        <p:nvPr/>
+      </p:nvGrpSpPr>
+      <p:grpSpPr>
+        <a:xfrm>
+          <a:off x="0" y="0"/>
+          <a:ext cx="0" cy="0"/>
+          <a:chOff x="0" y="0"/>
+          <a:chExt cx="0" cy="0"/>
+        </a:xfrm>
+      </p:grpSpPr>
+      <p:sp>
+        <p:nvSpPr>
+          <p:cNvPr id="2" name="タイトル 1"/>
+          <p:cNvSpPr>
+            <a:spLocks noGrp="1"/>
+          </p:cNvSpPr>
+          <p:nvPr>
+            <p:ph type="title"/>
+          </p:nvPr>
+        </p:nvSpPr>
+        <p:spPr/>
+        <p:txBody>
+          <a:bodyPr/>
+          <a:lstStyle/>
+          <a:p>
+            <a:r>
+              <a:rPr kumimoji="1" lang="ja-JP" altLang="en-US" dirty="0" smtClean="0"/>
+              <a:t>参考文献</a:t>
+            </a:r>
+            <a:endParaRPr kumimoji="1" lang="ja-JP" altLang="en-US" dirty="0"/>
+          </a:p>
+        </p:txBody>
+      </p:sp>
+      <p:sp>
+        <p:nvSpPr>
+          <p:cNvPr id="3" name="コンテンツ プレースホルダー 2"/>
+          <p:cNvSpPr>
+            <a:spLocks noGrp="1"/>
+          </p:cNvSpPr>
+          <p:nvPr>
+            <p:ph idx="1"/>
+          </p:nvPr>
+        </p:nvSpPr>
+        <p:spPr/>
+        <p:txBody>
+          <a:bodyPr/>
+          <a:lstStyle/>
+          <a:p>
+            <a:r>
+              <a:rPr kumimoji="1" lang="ja-JP" altLang="en-US" dirty="0" smtClean="0"/>
+              <a:t>競合っぽい論文</a:t>
+            </a:r>
+            <a:endParaRPr kumimoji="1" lang="en-US" altLang="ja-JP" dirty="0" smtClean="0"/>
+          </a:p>
+          <a:p>
+            <a:pPr lvl="1"/>
+            <a:r>
+              <a:rPr lang="ja-JP" altLang="en-US" sz="1050" dirty="0"/>
+              <a:t>「スマートフォンを用いた路面状況変化の検知</a:t>
+            </a:r>
+            <a:r>
+              <a:rPr lang="ja-JP" altLang="en-US" sz="1050" dirty="0" smtClean="0"/>
+              <a:t>手法」</a:t>
+            </a:r>
+            <a:r>
+              <a:rPr lang="en-US" altLang="ja-JP" sz="1050" dirty="0" smtClean="0">
+                <a:hlinkClick r:id="rId2"/>
+              </a:rPr>
+              <a:t>https</a:t>
+            </a:r>
+            <a:r>
+              <a:rPr lang="en-US" altLang="ja-JP" sz="1050" dirty="0">
+                <a:hlinkClick r:id="rId2"/>
+              </a:rPr>
+              <a:t>://ipsj.ixsq.nii.ac.jp/ej/index.php?action=pages_view_main&amp;active_action=repository_action_common_download&amp;item_id=111565&amp;item_no=1&amp;attribute_id=1&amp;file_no=1&amp;page_id=13&amp;block_id=</a:t>
+            </a:r>
+            <a:r>
+              <a:rPr lang="en-US" altLang="ja-JP" sz="1050" dirty="0" smtClean="0">
+                <a:hlinkClick r:id="rId2"/>
+              </a:rPr>
+              <a:t>8</a:t>
+            </a:r>
+            <a:endParaRPr lang="en-US" altLang="ja-JP" sz="1050" dirty="0" smtClean="0"/>
+          </a:p>
+          <a:p>
+            <a:pPr lvl="1"/>
+            <a:r>
+              <a:rPr lang="ja-JP" altLang="en-US" sz="1050" dirty="0" smtClean="0"/>
+              <a:t>「スマートフォンの加速度センサを用いた路面段差検出方法」</a:t>
+            </a:r>
+            <a:r>
+              <a:rPr lang="en-US" altLang="ja-JP" sz="1050" dirty="0" smtClean="0">
+                <a:hlinkClick r:id="rId3"/>
+              </a:rPr>
+              <a:t>http</a:t>
+            </a:r>
+            <a:r>
+              <a:rPr lang="en-US" altLang="ja-JP" sz="1050" dirty="0">
+                <a:hlinkClick r:id="rId3"/>
+              </a:rPr>
+              <a:t>://www.bumprecorder.com/wp-content/uploads/2013/12/</a:t>
+            </a:r>
+            <a:r>
+              <a:rPr lang="en-US" altLang="ja-JP" sz="1050" dirty="0" smtClean="0">
+                <a:hlinkClick r:id="rId3"/>
+              </a:rPr>
+              <a:t>409c3d378e11395f3dd362fde907731b.pdf</a:t>
+            </a:r>
+            <a:endParaRPr lang="en-US" altLang="ja-JP" sz="1050" dirty="0" smtClean="0"/>
+          </a:p>
+          <a:p>
+            <a:pPr lvl="1"/>
+            <a:r>
+              <a:rPr kumimoji="1" lang="ja-JP" altLang="en-US" sz="1050" dirty="0" smtClean="0"/>
+              <a:t>「</a:t>
+            </a:r>
+            <a:r>
+              <a:rPr kumimoji="1" lang="en-US" altLang="ja-JP" sz="1050" dirty="0" smtClean="0"/>
+              <a:t>Road Condition Detection using Smartphone Sensors: A Survey</a:t>
+            </a:r>
+            <a:r>
+              <a:rPr kumimoji="1" lang="ja-JP" altLang="en-US" sz="1050" dirty="0" smtClean="0"/>
+              <a:t>」</a:t>
+            </a:r>
+            <a:r>
+              <a:rPr lang="en-US" altLang="ja-JP" sz="1050" dirty="0">
+                <a:hlinkClick r:id="rId4"/>
+              </a:rPr>
+              <a:t>http://www.ripublication.com/irph/ijeee_spl/ijeeev7n6_09.</a:t>
+            </a:r>
+            <a:r>
+              <a:rPr lang="en-US" altLang="ja-JP" sz="1050" dirty="0" smtClean="0">
+                <a:hlinkClick r:id="rId4"/>
+              </a:rPr>
+              <a:t>pdf</a:t>
+            </a:r>
+            <a:endParaRPr lang="en-US" altLang="ja-JP" sz="1050" dirty="0" smtClean="0"/>
+          </a:p>
+          <a:p>
+            <a:pPr lvl="1"/>
+            <a:r>
+              <a:rPr lang="ja-JP" altLang="en-US" sz="1050" dirty="0" smtClean="0"/>
+              <a:t>「</a:t>
+            </a:r>
+            <a:r>
+              <a:rPr lang="en-US" altLang="ja-JP" sz="1050" dirty="0" smtClean="0"/>
+              <a:t>Wolverine: Traffic and Road Condition Estimation using Smartphone Sensors</a:t>
+            </a:r>
+            <a:r>
+              <a:rPr lang="ja-JP" altLang="en-US" sz="1050" dirty="0" smtClean="0"/>
+              <a:t>」</a:t>
+            </a:r>
+            <a:r>
+              <a:rPr lang="en-US" altLang="ja-JP" sz="1050" dirty="0">
+                <a:hlinkClick r:id="rId5"/>
+              </a:rPr>
+              <a:t>http://ravi.bhoraskar.com/papers/</a:t>
+            </a:r>
+            <a:r>
+              <a:rPr lang="en-US" altLang="ja-JP" sz="1050" dirty="0" smtClean="0">
+                <a:hlinkClick r:id="rId5"/>
+              </a:rPr>
+              <a:t>wolverine.pdf</a:t>
+            </a:r>
+            <a:endParaRPr lang="en-US" altLang="ja-JP" sz="1050" smtClean="0"/>
+          </a:p>
+          <a:p>
+            <a:pPr lvl="1"/>
+            <a:endParaRPr kumimoji="1" lang="ja-JP" altLang="en-US" sz="1050" dirty="0"/>
+          </a:p>
+        </p:txBody>
+      </p:sp>
+      <p:sp>
+        <p:nvSpPr>
+          <p:cNvPr id="4" name="スライド番号プレースホルダー 3"/>
+          <p:cNvSpPr>
+            <a:spLocks noGrp="1"/>
+          </p:cNvSpPr>
+          <p:nvPr>
+            <p:ph type="sldNum" sz="quarter" idx="10"/>
+          </p:nvPr>
+        </p:nvSpPr>
+        <p:spPr/>
+        <p:txBody>
+          <a:bodyPr/>
+          <a:lstStyle/>
+          <a:p>
+            <a:fld id="{D134A31E-EBD6-4211-BE66-DE6033771215}" type="slidenum">
+              <a:rPr kumimoji="1" lang="ja-JP" altLang="en-US" smtClean="0"/>
+              <a:t>5</a:t>
+            </a:fld>
+            <a:endParaRPr kumimoji="1" lang="ja-JP" altLang="en-US"/>
+          </a:p>
+        </p:txBody>
+      </p:sp>
+      <p:sp>
+        <p:nvSpPr>
+          <p:cNvPr id="5" name="日付プレースホルダー 4"/>
+          <p:cNvSpPr>
+            <a:spLocks noGrp="1"/>
+          </p:cNvSpPr>
+          <p:nvPr>
+            <p:ph type="dt" sz="half" idx="11"/>
+          </p:nvPr>
+        </p:nvSpPr>
+        <p:spPr/>
+        <p:txBody>
+          <a:bodyPr/>
+          <a:lstStyle/>
+          <a:p>
+            <a:fld id="{0A027B64-06A8-3048-9E35-F5ACF805419D}" type="datetime1">
+              <a:rPr kumimoji="1" lang="ja-JP" altLang="en-US" smtClean="0"/>
+              <a:t>15/08/12</a:t>
+            </a:fld>
+            <a:endParaRPr kumimoji="1" lang="ja-JP" altLang="en-US" dirty="0"/>
+          </a:p>
+        </p:txBody>
+      </p:sp>
+    </p:spTree>
+    <p:extLst>
+      <p:ext uri="{BB962C8B-B14F-4D97-AF65-F5344CB8AC3E}">
+        <p14:creationId xmlns:p14="http://schemas.microsoft.com/office/powerpoint/2010/main" val="1159228295"/>
       </p:ext>
     </p:extLst>
   </p:cSld>

</xml_diff>